<commit_message>
cambios sutiles en los documentos
</commit_message>
<xml_diff>
--- a/presentacionMineriaDeDatos.pptx
+++ b/presentacionMineriaDeDatos.pptx
@@ -4266,7 +4266,7 @@
 <file path=ppt/charts/chart1.xml><?xml version="1.0" encoding="utf-8"?>
 <c:chartSpace xmlns:c="http://schemas.openxmlformats.org/drawingml/2006/chart" xmlns:a="http://schemas.openxmlformats.org/drawingml/2006/main" xmlns:r="http://schemas.openxmlformats.org/officeDocument/2006/relationships" xmlns:c16r2="http://schemas.microsoft.com/office/drawing/2015/06/chart">
   <c:date1904 val="0"/>
-  <c:lang val="es-ES"/>
+  <c:lang val="en-US"/>
   <c:roundedCorners val="0"/>
   <mc:AlternateContent xmlns:mc="http://schemas.openxmlformats.org/markup-compatibility/2006">
     <mc:Choice xmlns:c14="http://schemas.microsoft.com/office/drawing/2007/8/2/chart" Requires="c14">
@@ -4303,7 +4303,7 @@
               <a:cs typeface="+mn-cs"/>
             </a:defRPr>
           </a:pPr>
-          <a:endParaRPr lang="es-CL"/>
+          <a:endParaRPr lang="en-US"/>
         </a:p>
       </c:txPr>
     </c:title>
@@ -4473,7 +4473,7 @@
                 <a:cs typeface="+mn-cs"/>
               </a:defRPr>
             </a:pPr>
-            <a:endParaRPr lang="es-CL"/>
+            <a:endParaRPr lang="en-US"/>
           </a:p>
         </c:txPr>
         <c:crossAx val="424868936"/>
@@ -4532,7 +4532,7 @@
                 <a:cs typeface="+mn-cs"/>
               </a:defRPr>
             </a:pPr>
-            <a:endParaRPr lang="es-CL"/>
+            <a:endParaRPr lang="en-US"/>
           </a:p>
         </c:txPr>
         <c:crossAx val="424870736"/>
@@ -4574,7 +4574,7 @@
               <a:cs typeface="+mn-cs"/>
             </a:defRPr>
           </a:pPr>
-          <a:endParaRPr lang="es-CL"/>
+          <a:endParaRPr lang="en-US"/>
         </a:p>
       </c:txPr>
     </c:legend>
@@ -4603,7 +4603,7 @@
       <a:pPr>
         <a:defRPr/>
       </a:pPr>
-      <a:endParaRPr lang="es-CL"/>
+      <a:endParaRPr lang="en-US"/>
     </a:p>
   </c:txPr>
   <c:externalData r:id="rId3">
@@ -4615,7 +4615,7 @@
 <file path=ppt/charts/chart2.xml><?xml version="1.0" encoding="utf-8"?>
 <c:chartSpace xmlns:c="http://schemas.openxmlformats.org/drawingml/2006/chart" xmlns:a="http://schemas.openxmlformats.org/drawingml/2006/main" xmlns:r="http://schemas.openxmlformats.org/officeDocument/2006/relationships" xmlns:c16r2="http://schemas.microsoft.com/office/drawing/2015/06/chart">
   <c:date1904 val="0"/>
-  <c:lang val="es-ES"/>
+  <c:lang val="en-US"/>
   <c:roundedCorners val="0"/>
   <mc:AlternateContent xmlns:mc="http://schemas.openxmlformats.org/markup-compatibility/2006">
     <mc:Choice xmlns:c14="http://schemas.microsoft.com/office/drawing/2007/8/2/chart" Requires="c14">
@@ -4652,7 +4652,7 @@
               <a:cs typeface="+mn-cs"/>
             </a:defRPr>
           </a:pPr>
-          <a:endParaRPr lang="es-CL"/>
+          <a:endParaRPr lang="en-US"/>
         </a:p>
       </c:txPr>
     </c:title>
@@ -4814,7 +4814,7 @@
                 <a:cs typeface="+mn-cs"/>
               </a:defRPr>
             </a:pPr>
-            <a:endParaRPr lang="es-CL"/>
+            <a:endParaRPr lang="en-US"/>
           </a:p>
         </c:txPr>
         <c:crossAx val="420620304"/>
@@ -4873,7 +4873,7 @@
                 <a:cs typeface="+mn-cs"/>
               </a:defRPr>
             </a:pPr>
-            <a:endParaRPr lang="es-CL"/>
+            <a:endParaRPr lang="en-US"/>
           </a:p>
         </c:txPr>
         <c:crossAx val="420619944"/>
@@ -4915,7 +4915,7 @@
               <a:cs typeface="+mn-cs"/>
             </a:defRPr>
           </a:pPr>
-          <a:endParaRPr lang="es-CL"/>
+          <a:endParaRPr lang="en-US"/>
         </a:p>
       </c:txPr>
     </c:legend>
@@ -4944,7 +4944,7 @@
       <a:pPr>
         <a:defRPr/>
       </a:pPr>
-      <a:endParaRPr lang="es-CL"/>
+      <a:endParaRPr lang="en-US"/>
     </a:p>
   </c:txPr>
   <c:externalData r:id="rId3">
@@ -4956,7 +4956,7 @@
 <file path=ppt/charts/chart3.xml><?xml version="1.0" encoding="utf-8"?>
 <c:chartSpace xmlns:c="http://schemas.openxmlformats.org/drawingml/2006/chart" xmlns:a="http://schemas.openxmlformats.org/drawingml/2006/main" xmlns:r="http://schemas.openxmlformats.org/officeDocument/2006/relationships" xmlns:c16r2="http://schemas.microsoft.com/office/drawing/2015/06/chart">
   <c:date1904 val="0"/>
-  <c:lang val="es-ES"/>
+  <c:lang val="en-US"/>
   <c:roundedCorners val="0"/>
   <mc:AlternateContent xmlns:mc="http://schemas.openxmlformats.org/markup-compatibility/2006">
     <mc:Choice xmlns:c14="http://schemas.microsoft.com/office/drawing/2007/8/2/chart" Requires="c14">
@@ -4993,7 +4993,7 @@
               <a:cs typeface="+mn-cs"/>
             </a:defRPr>
           </a:pPr>
-          <a:endParaRPr lang="es-CL"/>
+          <a:endParaRPr lang="en-US"/>
         </a:p>
       </c:txPr>
     </c:title>
@@ -5155,7 +5155,7 @@
                 <a:cs typeface="+mn-cs"/>
               </a:defRPr>
             </a:pPr>
-            <a:endParaRPr lang="es-CL"/>
+            <a:endParaRPr lang="en-US"/>
           </a:p>
         </c:txPr>
         <c:crossAx val="626788072"/>
@@ -5214,7 +5214,7 @@
                 <a:cs typeface="+mn-cs"/>
               </a:defRPr>
             </a:pPr>
-            <a:endParaRPr lang="es-CL"/>
+            <a:endParaRPr lang="en-US"/>
           </a:p>
         </c:txPr>
         <c:crossAx val="626790592"/>
@@ -5256,7 +5256,7 @@
               <a:cs typeface="+mn-cs"/>
             </a:defRPr>
           </a:pPr>
-          <a:endParaRPr lang="es-CL"/>
+          <a:endParaRPr lang="en-US"/>
         </a:p>
       </c:txPr>
     </c:legend>
@@ -5285,7 +5285,7 @@
       <a:pPr>
         <a:defRPr/>
       </a:pPr>
-      <a:endParaRPr lang="es-CL"/>
+      <a:endParaRPr lang="en-US"/>
     </a:p>
   </c:txPr>
   <c:externalData r:id="rId3">
@@ -7229,7 +7229,7 @@
           <a:p>
             <a:fld id="{80AD1966-643A-ED45-BFF9-B0FE18A32E2B}" type="slidenum">
               <a:rPr lang="es-ES_tradnl" smtClean="0"/>
-              <a:t>‹Nº›</a:t>
+              <a:t>‹#›</a:t>
             </a:fld>
             <a:endParaRPr lang="es-ES_tradnl"/>
           </a:p>
@@ -8354,7 +8354,7 @@
           <a:p>
             <a:fld id="{3352F6F5-E16D-F340-A90C-ABCF032D59B6}" type="slidenum">
               <a:rPr lang="es-ES_tradnl" smtClean="0"/>
-              <a:t>‹Nº›</a:t>
+              <a:t>‹#›</a:t>
             </a:fld>
             <a:endParaRPr lang="es-ES_tradnl"/>
           </a:p>
@@ -8519,7 +8519,7 @@
           <a:p>
             <a:fld id="{3352F6F5-E16D-F340-A90C-ABCF032D59B6}" type="slidenum">
               <a:rPr lang="es-ES_tradnl" smtClean="0"/>
-              <a:t>‹Nº›</a:t>
+              <a:t>‹#›</a:t>
             </a:fld>
             <a:endParaRPr lang="es-ES_tradnl"/>
           </a:p>
@@ -8694,7 +8694,7 @@
           <a:p>
             <a:fld id="{3352F6F5-E16D-F340-A90C-ABCF032D59B6}" type="slidenum">
               <a:rPr lang="es-ES_tradnl" smtClean="0"/>
-              <a:t>‹Nº›</a:t>
+              <a:t>‹#›</a:t>
             </a:fld>
             <a:endParaRPr lang="es-ES_tradnl"/>
           </a:p>
@@ -8859,7 +8859,7 @@
           <a:p>
             <a:fld id="{3352F6F5-E16D-F340-A90C-ABCF032D59B6}" type="slidenum">
               <a:rPr lang="es-ES_tradnl" smtClean="0"/>
-              <a:t>‹Nº›</a:t>
+              <a:t>‹#›</a:t>
             </a:fld>
             <a:endParaRPr lang="es-ES_tradnl"/>
           </a:p>
@@ -9098,7 +9098,7 @@
           <a:p>
             <a:fld id="{3352F6F5-E16D-F340-A90C-ABCF032D59B6}" type="slidenum">
               <a:rPr lang="es-ES_tradnl" smtClean="0"/>
-              <a:t>‹Nº›</a:t>
+              <a:t>‹#›</a:t>
             </a:fld>
             <a:endParaRPr lang="es-ES_tradnl"/>
           </a:p>
@@ -9325,7 +9325,7 @@
           <a:p>
             <a:fld id="{3352F6F5-E16D-F340-A90C-ABCF032D59B6}" type="slidenum">
               <a:rPr lang="es-ES_tradnl" smtClean="0"/>
-              <a:t>‹Nº›</a:t>
+              <a:t>‹#›</a:t>
             </a:fld>
             <a:endParaRPr lang="es-ES_tradnl"/>
           </a:p>
@@ -9687,7 +9687,7 @@
           <a:p>
             <a:fld id="{3352F6F5-E16D-F340-A90C-ABCF032D59B6}" type="slidenum">
               <a:rPr lang="es-ES_tradnl" smtClean="0"/>
-              <a:t>‹Nº›</a:t>
+              <a:t>‹#›</a:t>
             </a:fld>
             <a:endParaRPr lang="es-ES_tradnl"/>
           </a:p>
@@ -9800,7 +9800,7 @@
           <a:p>
             <a:fld id="{3352F6F5-E16D-F340-A90C-ABCF032D59B6}" type="slidenum">
               <a:rPr lang="es-ES_tradnl" smtClean="0"/>
-              <a:t>‹Nº›</a:t>
+              <a:t>‹#›</a:t>
             </a:fld>
             <a:endParaRPr lang="es-ES_tradnl"/>
           </a:p>
@@ -9890,7 +9890,7 @@
           <a:p>
             <a:fld id="{3352F6F5-E16D-F340-A90C-ABCF032D59B6}" type="slidenum">
               <a:rPr lang="es-ES_tradnl" smtClean="0"/>
-              <a:t>‹Nº›</a:t>
+              <a:t>‹#›</a:t>
             </a:fld>
             <a:endParaRPr lang="es-ES_tradnl"/>
           </a:p>
@@ -10162,7 +10162,7 @@
           <a:p>
             <a:fld id="{3352F6F5-E16D-F340-A90C-ABCF032D59B6}" type="slidenum">
               <a:rPr lang="es-ES_tradnl" smtClean="0"/>
-              <a:t>‹Nº›</a:t>
+              <a:t>‹#›</a:t>
             </a:fld>
             <a:endParaRPr lang="es-ES_tradnl"/>
           </a:p>
@@ -10414,7 +10414,7 @@
           <a:p>
             <a:fld id="{3352F6F5-E16D-F340-A90C-ABCF032D59B6}" type="slidenum">
               <a:rPr lang="es-ES_tradnl" smtClean="0"/>
-              <a:t>‹Nº›</a:t>
+              <a:t>‹#›</a:t>
             </a:fld>
             <a:endParaRPr lang="es-ES_tradnl"/>
           </a:p>
@@ -10658,7 +10658,7 @@
           <a:p>
             <a:fld id="{3352F6F5-E16D-F340-A90C-ABCF032D59B6}" type="slidenum">
               <a:rPr lang="es-ES_tradnl" smtClean="0"/>
-              <a:t>‹Nº›</a:t>
+              <a:t>‹#›</a:t>
             </a:fld>
             <a:endParaRPr lang="es-ES_tradnl"/>
           </a:p>

</xml_diff>

<commit_message>
nueva modificacion en la presentación
</commit_message>
<xml_diff>
--- a/presentacionMineriaDeDatos.pptx
+++ b/presentacionMineriaDeDatos.pptx
@@ -131,7 +131,7 @@
     <p1510:client id="{3A7F9412-3488-4BA4-8AB4-0FB30BEA8B99}" v="39" dt="2024-04-19T02:05:59.585"/>
     <p1510:client id="{512BB393-AFC8-321A-CA6F-0FE68B77EE34}" v="793" vWet="910" dt="2024-04-19T01:59:01.618"/>
     <p1510:client id="{5B4D70C6-83A3-41C3-8256-4EC1A969E359}" v="332" dt="2024-04-19T02:34:15.727"/>
-    <p1510:client id="{6ACD99B5-93F1-D704-0CFC-093CEABA2219}" v="23" dt="2024-04-19T02:36:50.876"/>
+    <p1510:client id="{6ACD99B5-93F1-D704-0CFC-093CEABA2219}" v="25" dt="2024-04-19T02:37:23.361"/>
     <p1510:client id="{CCE71196-D9EA-5FF5-3E05-183E6D1705FC}" v="8" dt="2024-04-19T02:33:07.451"/>
   </p1510:revLst>
 </p1510:revInfo>
@@ -525,12 +525,12 @@
   <pc:docChgLst>
     <pc:chgData name="PEREZ VERGARA MELANY" userId="S::m.perezvergara@uandresbello.edu::d95698a7-632e-4c03-ab0f-564477513d69" providerId="AD" clId="Web-{6ACD99B5-93F1-D704-0CFC-093CEABA2219}"/>
     <pc:docChg chg="delSld modSld">
-      <pc:chgData name="PEREZ VERGARA MELANY" userId="S::m.perezvergara@uandresbello.edu::d95698a7-632e-4c03-ab0f-564477513d69" providerId="AD" clId="Web-{6ACD99B5-93F1-D704-0CFC-093CEABA2219}" dt="2024-04-19T02:36:50.876" v="21" actId="20577"/>
+      <pc:chgData name="PEREZ VERGARA MELANY" userId="S::m.perezvergara@uandresbello.edu::d95698a7-632e-4c03-ab0f-564477513d69" providerId="AD" clId="Web-{6ACD99B5-93F1-D704-0CFC-093CEABA2219}" dt="2024-04-19T02:37:23.361" v="23" actId="20577"/>
       <pc:docMkLst>
         <pc:docMk/>
       </pc:docMkLst>
       <pc:sldChg chg="modSp">
-        <pc:chgData name="PEREZ VERGARA MELANY" userId="S::m.perezvergara@uandresbello.edu::d95698a7-632e-4c03-ab0f-564477513d69" providerId="AD" clId="Web-{6ACD99B5-93F1-D704-0CFC-093CEABA2219}" dt="2024-04-19T02:36:50.876" v="21" actId="20577"/>
+        <pc:chgData name="PEREZ VERGARA MELANY" userId="S::m.perezvergara@uandresbello.edu::d95698a7-632e-4c03-ab0f-564477513d69" providerId="AD" clId="Web-{6ACD99B5-93F1-D704-0CFC-093CEABA2219}" dt="2024-04-19T02:37:23.361" v="23" actId="20577"/>
         <pc:sldMkLst>
           <pc:docMk/>
           <pc:sldMk cId="4002806811" sldId="305"/>
@@ -544,7 +544,7 @@
           </ac:spMkLst>
         </pc:spChg>
         <pc:spChg chg="mod">
-          <ac:chgData name="PEREZ VERGARA MELANY" userId="S::m.perezvergara@uandresbello.edu::d95698a7-632e-4c03-ab0f-564477513d69" providerId="AD" clId="Web-{6ACD99B5-93F1-D704-0CFC-093CEABA2219}" dt="2024-04-19T02:36:50.876" v="21" actId="20577"/>
+          <ac:chgData name="PEREZ VERGARA MELANY" userId="S::m.perezvergara@uandresbello.edu::d95698a7-632e-4c03-ab0f-564477513d69" providerId="AD" clId="Web-{6ACD99B5-93F1-D704-0CFC-093CEABA2219}" dt="2024-04-19T02:37:23.361" v="23" actId="20577"/>
           <ac:spMkLst>
             <pc:docMk/>
             <pc:sldMk cId="4002806811" sldId="305"/>
@@ -20004,7 +20004,7 @@
                 </a:solidFill>
                 <a:latin typeface="Arial Narrow"/>
               </a:rPr>
-              <a:t> significativa sobre la </a:t>
+              <a:t> sobre la </a:t>
             </a:r>
             <a:r>
               <a:rPr lang="es-ES" sz="1500" err="1">

</xml_diff>